<commit_message>
fix bug(search hash, list update)
</commit_message>
<xml_diff>
--- a/project_doc_201611263_박성호.pptx
+++ b/project_doc_201611263_박성호.pptx
@@ -9,6 +9,10 @@
     <p:sldId id="257" r:id="rId3"/>
     <p:sldId id="258" r:id="rId4"/>
     <p:sldId id="259" r:id="rId5"/>
+    <p:sldId id="260" r:id="rId6"/>
+    <p:sldId id="261" r:id="rId7"/>
+    <p:sldId id="262" r:id="rId8"/>
+    <p:sldId id="263" r:id="rId9"/>
   </p:sldIdLst>
   <p:sldSz cx="12192000" cy="6858000"/>
   <p:notesSz cx="6858000" cy="9144000"/>
@@ -107,6 +111,11 @@
       </a:defRPr>
     </a:lvl9pPr>
   </p:defaultTextStyle>
+  <p:extLst>
+    <p:ext uri="{EFAFB233-063F-42B5-8137-9DF3F51BA10A}">
+      <p15:sldGuideLst xmlns:p15="http://schemas.microsoft.com/office/powerpoint/2012/main"/>
+    </p:ext>
+  </p:extLst>
 </p:presentation>
 </file>
 
@@ -2979,7 +2988,7 @@
         </p:nvSpPr>
         <p:spPr>
           <a:xfrm>
-            <a:off x="1524000" y="385011"/>
+            <a:off x="1524000" y="946484"/>
             <a:ext cx="9144000" cy="2873412"/>
           </a:xfrm>
         </p:spPr>
@@ -3117,8 +3126,8 @@
         </p:nvSpPr>
         <p:spPr>
           <a:xfrm>
-            <a:off x="1620252" y="1361274"/>
-            <a:ext cx="9144000" cy="1655762"/>
+            <a:off x="1780673" y="1040431"/>
+            <a:ext cx="8951495" cy="4622431"/>
           </a:xfrm>
           <a:prstGeom prst="rect">
             <a:avLst/>
@@ -3292,6 +3301,9 @@
           </a:lstStyle>
           <a:p>
             <a:pPr marL="514350" indent="-514350">
+              <a:lnSpc>
+                <a:spcPct val="150000"/>
+              </a:lnSpc>
               <a:buFont typeface="+mj-lt"/>
               <a:buAutoNum type="arabicPeriod"/>
             </a:pPr>
@@ -3307,6 +3319,9 @@
           </a:p>
           <a:p>
             <a:pPr marL="514350" indent="-514350">
+              <a:lnSpc>
+                <a:spcPct val="150000"/>
+              </a:lnSpc>
               <a:buFont typeface="+mj-lt"/>
               <a:buAutoNum type="arabicPeriod"/>
             </a:pPr>
@@ -3322,6 +3337,9 @@
           </a:p>
           <a:p>
             <a:pPr marL="514350" indent="-514350">
+              <a:lnSpc>
+                <a:spcPct val="150000"/>
+              </a:lnSpc>
               <a:buFont typeface="+mj-lt"/>
               <a:buAutoNum type="arabicPeriod"/>
             </a:pPr>
@@ -3377,8 +3395,8 @@
         </p:nvSpPr>
         <p:spPr>
           <a:xfrm>
-            <a:off x="3609473" y="318536"/>
-            <a:ext cx="8422106" cy="6202580"/>
+            <a:off x="3160294" y="-222886"/>
+            <a:ext cx="9031706" cy="7281411"/>
           </a:xfrm>
           <a:prstGeom prst="rect">
             <a:avLst/>
@@ -3661,9 +3679,66 @@
               <a:rPr lang="ko-KR" altLang="en-US" dirty="0" smtClean="0">
                 <a:latin typeface="+mn-ea"/>
               </a:rPr>
-              <a:t>를 제공받고 다루는데 사용</a:t>
-            </a:r>
-            <a:endParaRPr lang="en-US" altLang="ko-KR" sz="4400" dirty="0" smtClean="0">
+              <a:t>를 제공받고 다루는데 </a:t>
+            </a:r>
+            <a:r>
+              <a:rPr lang="ko-KR" altLang="en-US" dirty="0" smtClean="0">
+                <a:latin typeface="+mn-ea"/>
+              </a:rPr>
+              <a:t>사용</a:t>
+            </a:r>
+            <a:endParaRPr lang="en-US" altLang="ko-KR" dirty="0" smtClean="0">
+              <a:latin typeface="+mn-ea"/>
+            </a:endParaRPr>
+          </a:p>
+          <a:p>
+            <a:pPr>
+              <a:lnSpc>
+                <a:spcPct val="150000"/>
+              </a:lnSpc>
+            </a:pPr>
+            <a:r>
+              <a:rPr lang="en-US" altLang="ko-KR" sz="4400" dirty="0" smtClean="0">
+                <a:latin typeface="+mn-ea"/>
+              </a:rPr>
+              <a:t>Bootstrap</a:t>
+            </a:r>
+            <a:br>
+              <a:rPr lang="en-US" altLang="ko-KR" sz="4400" dirty="0" smtClean="0">
+                <a:latin typeface="+mn-ea"/>
+              </a:rPr>
+            </a:br>
+            <a:r>
+              <a:rPr lang="ko-KR" altLang="en-US" dirty="0" smtClean="0">
+                <a:latin typeface="+mn-ea"/>
+              </a:rPr>
+              <a:t>각종 </a:t>
+            </a:r>
+            <a:r>
+              <a:rPr lang="en-US" altLang="ko-KR" dirty="0" smtClean="0">
+                <a:latin typeface="+mn-ea"/>
+              </a:rPr>
+              <a:t>CSS</a:t>
+            </a:r>
+            <a:r>
+              <a:rPr lang="ko-KR" altLang="en-US" dirty="0">
+                <a:latin typeface="+mn-ea"/>
+              </a:rPr>
+              <a:t> </a:t>
+            </a:r>
+            <a:r>
+              <a:rPr lang="en-US" altLang="ko-KR" dirty="0" smtClean="0">
+                <a:latin typeface="+mn-ea"/>
+              </a:rPr>
+              <a:t>Framework</a:t>
+            </a:r>
+            <a:r>
+              <a:rPr lang="ko-KR" altLang="en-US" dirty="0" smtClean="0">
+                <a:latin typeface="+mn-ea"/>
+              </a:rPr>
+              <a:t>으로 페이지 디자인하는데 사용</a:t>
+            </a:r>
+            <a:endParaRPr lang="en-US" altLang="ko-KR" dirty="0" smtClean="0">
               <a:latin typeface="+mn-ea"/>
             </a:endParaRPr>
           </a:p>
@@ -3679,7 +3754,7 @@
         </p:nvSpPr>
         <p:spPr>
           <a:xfrm>
-            <a:off x="288757" y="2660685"/>
+            <a:off x="128335" y="2628601"/>
             <a:ext cx="3031959" cy="1141294"/>
           </a:xfrm>
           <a:prstGeom prst="rect">
@@ -3912,10 +3987,1294 @@
           <a:chExt cx="0" cy="0"/>
         </a:xfrm>
       </p:grpSpPr>
+      <p:sp>
+        <p:nvSpPr>
+          <p:cNvPr id="2" name="Subtitle 2"/>
+          <p:cNvSpPr txBox="1">
+            <a:spLocks/>
+          </p:cNvSpPr>
+          <p:nvPr/>
+        </p:nvSpPr>
+        <p:spPr>
+          <a:xfrm>
+            <a:off x="-112295" y="126719"/>
+            <a:ext cx="6898105" cy="740243"/>
+          </a:xfrm>
+          <a:prstGeom prst="rect">
+            <a:avLst/>
+          </a:prstGeom>
+        </p:spPr>
+        <p:txBody>
+          <a:bodyPr/>
+          <a:lstStyle>
+            <a:lvl1pPr marL="228600" indent="-228600" algn="l" defTabSz="914400" rtl="0" eaLnBrk="1" latinLnBrk="1" hangingPunct="1">
+              <a:lnSpc>
+                <a:spcPct val="90000"/>
+              </a:lnSpc>
+              <a:spcBef>
+                <a:spcPts val="1000"/>
+              </a:spcBef>
+              <a:buFont typeface="Arial" panose="020B0604020202020204" pitchFamily="34" charset="0"/>
+              <a:buChar char="•"/>
+              <a:defRPr sz="2800" kern="1200">
+                <a:solidFill>
+                  <a:schemeClr val="tx1"/>
+                </a:solidFill>
+                <a:latin typeface="+mn-lt"/>
+                <a:ea typeface="+mn-ea"/>
+                <a:cs typeface="+mn-cs"/>
+              </a:defRPr>
+            </a:lvl1pPr>
+            <a:lvl2pPr marL="685800" indent="-228600" algn="l" defTabSz="914400" rtl="0" eaLnBrk="1" latinLnBrk="1" hangingPunct="1">
+              <a:lnSpc>
+                <a:spcPct val="90000"/>
+              </a:lnSpc>
+              <a:spcBef>
+                <a:spcPts val="500"/>
+              </a:spcBef>
+              <a:buFont typeface="Arial" panose="020B0604020202020204" pitchFamily="34" charset="0"/>
+              <a:buChar char="•"/>
+              <a:defRPr sz="2400" kern="1200">
+                <a:solidFill>
+                  <a:schemeClr val="tx1"/>
+                </a:solidFill>
+                <a:latin typeface="+mn-lt"/>
+                <a:ea typeface="+mn-ea"/>
+                <a:cs typeface="+mn-cs"/>
+              </a:defRPr>
+            </a:lvl2pPr>
+            <a:lvl3pPr marL="1143000" indent="-228600" algn="l" defTabSz="914400" rtl="0" eaLnBrk="1" latinLnBrk="1" hangingPunct="1">
+              <a:lnSpc>
+                <a:spcPct val="90000"/>
+              </a:lnSpc>
+              <a:spcBef>
+                <a:spcPts val="500"/>
+              </a:spcBef>
+              <a:buFont typeface="Arial" panose="020B0604020202020204" pitchFamily="34" charset="0"/>
+              <a:buChar char="•"/>
+              <a:defRPr sz="2000" kern="1200">
+                <a:solidFill>
+                  <a:schemeClr val="tx1"/>
+                </a:solidFill>
+                <a:latin typeface="+mn-lt"/>
+                <a:ea typeface="+mn-ea"/>
+                <a:cs typeface="+mn-cs"/>
+              </a:defRPr>
+            </a:lvl3pPr>
+            <a:lvl4pPr marL="1600200" indent="-228600" algn="l" defTabSz="914400" rtl="0" eaLnBrk="1" latinLnBrk="1" hangingPunct="1">
+              <a:lnSpc>
+                <a:spcPct val="90000"/>
+              </a:lnSpc>
+              <a:spcBef>
+                <a:spcPts val="500"/>
+              </a:spcBef>
+              <a:buFont typeface="Arial" panose="020B0604020202020204" pitchFamily="34" charset="0"/>
+              <a:buChar char="•"/>
+              <a:defRPr sz="1800" kern="1200">
+                <a:solidFill>
+                  <a:schemeClr val="tx1"/>
+                </a:solidFill>
+                <a:latin typeface="+mn-lt"/>
+                <a:ea typeface="+mn-ea"/>
+                <a:cs typeface="+mn-cs"/>
+              </a:defRPr>
+            </a:lvl4pPr>
+            <a:lvl5pPr marL="2057400" indent="-228600" algn="l" defTabSz="914400" rtl="0" eaLnBrk="1" latinLnBrk="1" hangingPunct="1">
+              <a:lnSpc>
+                <a:spcPct val="90000"/>
+              </a:lnSpc>
+              <a:spcBef>
+                <a:spcPts val="500"/>
+              </a:spcBef>
+              <a:buFont typeface="Arial" panose="020B0604020202020204" pitchFamily="34" charset="0"/>
+              <a:buChar char="•"/>
+              <a:defRPr sz="1800" kern="1200">
+                <a:solidFill>
+                  <a:schemeClr val="tx1"/>
+                </a:solidFill>
+                <a:latin typeface="+mn-lt"/>
+                <a:ea typeface="+mn-ea"/>
+                <a:cs typeface="+mn-cs"/>
+              </a:defRPr>
+            </a:lvl5pPr>
+            <a:lvl6pPr marL="2514600" indent="-228600" algn="l" defTabSz="914400" rtl="0" eaLnBrk="1" latinLnBrk="1" hangingPunct="1">
+              <a:lnSpc>
+                <a:spcPct val="90000"/>
+              </a:lnSpc>
+              <a:spcBef>
+                <a:spcPts val="500"/>
+              </a:spcBef>
+              <a:buFont typeface="Arial" panose="020B0604020202020204" pitchFamily="34" charset="0"/>
+              <a:buChar char="•"/>
+              <a:defRPr sz="1800" kern="1200">
+                <a:solidFill>
+                  <a:schemeClr val="tx1"/>
+                </a:solidFill>
+                <a:latin typeface="+mn-lt"/>
+                <a:ea typeface="+mn-ea"/>
+                <a:cs typeface="+mn-cs"/>
+              </a:defRPr>
+            </a:lvl6pPr>
+            <a:lvl7pPr marL="2971800" indent="-228600" algn="l" defTabSz="914400" rtl="0" eaLnBrk="1" latinLnBrk="1" hangingPunct="1">
+              <a:lnSpc>
+                <a:spcPct val="90000"/>
+              </a:lnSpc>
+              <a:spcBef>
+                <a:spcPts val="500"/>
+              </a:spcBef>
+              <a:buFont typeface="Arial" panose="020B0604020202020204" pitchFamily="34" charset="0"/>
+              <a:buChar char="•"/>
+              <a:defRPr sz="1800" kern="1200">
+                <a:solidFill>
+                  <a:schemeClr val="tx1"/>
+                </a:solidFill>
+                <a:latin typeface="+mn-lt"/>
+                <a:ea typeface="+mn-ea"/>
+                <a:cs typeface="+mn-cs"/>
+              </a:defRPr>
+            </a:lvl7pPr>
+            <a:lvl8pPr marL="3429000" indent="-228600" algn="l" defTabSz="914400" rtl="0" eaLnBrk="1" latinLnBrk="1" hangingPunct="1">
+              <a:lnSpc>
+                <a:spcPct val="90000"/>
+              </a:lnSpc>
+              <a:spcBef>
+                <a:spcPts val="500"/>
+              </a:spcBef>
+              <a:buFont typeface="Arial" panose="020B0604020202020204" pitchFamily="34" charset="0"/>
+              <a:buChar char="•"/>
+              <a:defRPr sz="1800" kern="1200">
+                <a:solidFill>
+                  <a:schemeClr val="tx1"/>
+                </a:solidFill>
+                <a:latin typeface="+mn-lt"/>
+                <a:ea typeface="+mn-ea"/>
+                <a:cs typeface="+mn-cs"/>
+              </a:defRPr>
+            </a:lvl8pPr>
+            <a:lvl9pPr marL="3886200" indent="-228600" algn="l" defTabSz="914400" rtl="0" eaLnBrk="1" latinLnBrk="1" hangingPunct="1">
+              <a:lnSpc>
+                <a:spcPct val="90000"/>
+              </a:lnSpc>
+              <a:spcBef>
+                <a:spcPts val="500"/>
+              </a:spcBef>
+              <a:buFont typeface="Arial" panose="020B0604020202020204" pitchFamily="34" charset="0"/>
+              <a:buChar char="•"/>
+              <a:defRPr sz="1800" kern="1200">
+                <a:solidFill>
+                  <a:schemeClr val="tx1"/>
+                </a:solidFill>
+                <a:latin typeface="+mn-lt"/>
+                <a:ea typeface="+mn-ea"/>
+                <a:cs typeface="+mn-cs"/>
+              </a:defRPr>
+            </a:lvl9pPr>
+          </a:lstStyle>
+          <a:p>
+            <a:pPr marL="0" indent="0" algn="ctr">
+              <a:buNone/>
+            </a:pPr>
+            <a:r>
+              <a:rPr lang="ko-KR" altLang="en-US" sz="4000" dirty="0" smtClean="0">
+                <a:latin typeface="+mn-ea"/>
+              </a:rPr>
+              <a:t>레이아웃 구성</a:t>
+            </a:r>
+            <a:r>
+              <a:rPr lang="en-US" altLang="ko-KR" sz="4000" dirty="0" smtClean="0">
+                <a:latin typeface="+mn-ea"/>
+              </a:rPr>
+              <a:t>, Intro Page</a:t>
+            </a:r>
+            <a:endParaRPr lang="ko-KR" altLang="en-US" sz="4000" dirty="0">
+              <a:latin typeface="+mn-ea"/>
+            </a:endParaRPr>
+          </a:p>
+        </p:txBody>
+      </p:sp>
+      <p:pic>
+        <p:nvPicPr>
+          <p:cNvPr id="3" name="Picture 2"/>
+          <p:cNvPicPr>
+            <a:picLocks noChangeAspect="1"/>
+          </p:cNvPicPr>
+          <p:nvPr/>
+        </p:nvPicPr>
+        <p:blipFill>
+          <a:blip r:embed="rId2" cstate="print">
+            <a:extLst>
+              <a:ext uri="{28A0092B-C50C-407E-A947-70E740481C1C}">
+                <a14:useLocalDpi xmlns:a14="http://schemas.microsoft.com/office/drawing/2010/main" val="0"/>
+              </a:ext>
+            </a:extLst>
+          </a:blip>
+          <a:stretch>
+            <a:fillRect/>
+          </a:stretch>
+        </p:blipFill>
+        <p:spPr>
+          <a:xfrm>
+            <a:off x="376023" y="1257859"/>
+            <a:ext cx="11543262" cy="5290663"/>
+          </a:xfrm>
+          <a:prstGeom prst="rect">
+            <a:avLst/>
+          </a:prstGeom>
+          <a:ln>
+            <a:solidFill>
+              <a:schemeClr val="tx1"/>
+            </a:solidFill>
+          </a:ln>
+        </p:spPr>
+      </p:pic>
+      <p:sp>
+        <p:nvSpPr>
+          <p:cNvPr id="4" name="Rectangle 3"/>
+          <p:cNvSpPr/>
+          <p:nvPr/>
+        </p:nvSpPr>
+        <p:spPr>
+          <a:xfrm>
+            <a:off x="3336758" y="1299411"/>
+            <a:ext cx="5502442" cy="3352800"/>
+          </a:xfrm>
+          <a:prstGeom prst="rect">
+            <a:avLst/>
+          </a:prstGeom>
+          <a:noFill/>
+          <a:ln w="57150">
+            <a:solidFill>
+              <a:srgbClr val="FF0000"/>
+            </a:solidFill>
+            <a:prstDash val="dash"/>
+          </a:ln>
+        </p:spPr>
+        <p:style>
+          <a:lnRef idx="2">
+            <a:schemeClr val="accent1">
+              <a:shade val="50000"/>
+            </a:schemeClr>
+          </a:lnRef>
+          <a:fillRef idx="1">
+            <a:schemeClr val="accent1"/>
+          </a:fillRef>
+          <a:effectRef idx="0">
+            <a:schemeClr val="accent1"/>
+          </a:effectRef>
+          <a:fontRef idx="minor">
+            <a:schemeClr val="lt1"/>
+          </a:fontRef>
+        </p:style>
+        <p:txBody>
+          <a:bodyPr rtlCol="0" anchor="ctr"/>
+          <a:lstStyle/>
+          <a:p>
+            <a:pPr algn="ctr"/>
+            <a:endParaRPr lang="ko-KR" altLang="en-US"/>
+          </a:p>
+        </p:txBody>
+      </p:sp>
+      <p:sp>
+        <p:nvSpPr>
+          <p:cNvPr id="6" name="Line Callout 1 (Border and Accent Bar) 5"/>
+          <p:cNvSpPr/>
+          <p:nvPr/>
+        </p:nvSpPr>
+        <p:spPr>
+          <a:xfrm>
+            <a:off x="9252767" y="1462312"/>
+            <a:ext cx="1607738" cy="1329015"/>
+          </a:xfrm>
+          <a:prstGeom prst="accentBorderCallout1">
+            <a:avLst>
+              <a:gd name="adj1" fmla="val 18750"/>
+              <a:gd name="adj2" fmla="val -4670"/>
+              <a:gd name="adj3" fmla="val 77061"/>
+              <a:gd name="adj4" fmla="val -55429"/>
+            </a:avLst>
+          </a:prstGeom>
+        </p:spPr>
+        <p:style>
+          <a:lnRef idx="2">
+            <a:schemeClr val="dk1">
+              <a:shade val="50000"/>
+            </a:schemeClr>
+          </a:lnRef>
+          <a:fillRef idx="1">
+            <a:schemeClr val="dk1"/>
+          </a:fillRef>
+          <a:effectRef idx="0">
+            <a:schemeClr val="dk1"/>
+          </a:effectRef>
+          <a:fontRef idx="minor">
+            <a:schemeClr val="lt1"/>
+          </a:fontRef>
+        </p:style>
+        <p:txBody>
+          <a:bodyPr rtlCol="0" anchor="ctr"/>
+          <a:lstStyle/>
+          <a:p>
+            <a:pPr algn="ctr"/>
+            <a:r>
+              <a:rPr lang="en-US" altLang="ko-KR" dirty="0"/>
+              <a:t>col-md-6 </a:t>
+            </a:r>
+            <a:endParaRPr lang="en-US" altLang="ko-KR" dirty="0" smtClean="0"/>
+          </a:p>
+          <a:p>
+            <a:pPr algn="ctr"/>
+            <a:r>
+              <a:rPr lang="en-US" altLang="ko-KR" dirty="0" smtClean="0"/>
+              <a:t>col-sm-7 </a:t>
+            </a:r>
+          </a:p>
+          <a:p>
+            <a:pPr algn="ctr"/>
+            <a:r>
+              <a:rPr lang="en-US" altLang="ko-KR" dirty="0" smtClean="0"/>
+              <a:t>col-xs-10</a:t>
+            </a:r>
+            <a:endParaRPr lang="ko-KR" altLang="en-US" dirty="0"/>
+          </a:p>
+        </p:txBody>
+      </p:sp>
     </p:spTree>
     <p:extLst>
       <p:ext uri="{BB962C8B-B14F-4D97-AF65-F5344CB8AC3E}">
         <p14:creationId xmlns:p14="http://schemas.microsoft.com/office/powerpoint/2010/main" val="2114835762"/>
+      </p:ext>
+    </p:extLst>
+  </p:cSld>
+  <p:clrMapOvr>
+    <a:masterClrMapping/>
+  </p:clrMapOvr>
+</p:sld>
+</file>
+
+<file path=ppt/slides/slide5.xml><?xml version="1.0" encoding="utf-8"?>
+<p:sld xmlns:a="http://schemas.openxmlformats.org/drawingml/2006/main" xmlns:r="http://schemas.openxmlformats.org/officeDocument/2006/relationships" xmlns:p="http://schemas.openxmlformats.org/presentationml/2006/main">
+  <p:cSld>
+    <p:spTree>
+      <p:nvGrpSpPr>
+        <p:cNvPr id="1" name=""/>
+        <p:cNvGrpSpPr/>
+        <p:nvPr/>
+      </p:nvGrpSpPr>
+      <p:grpSpPr>
+        <a:xfrm>
+          <a:off x="0" y="0"/>
+          <a:ext cx="0" cy="0"/>
+          <a:chOff x="0" y="0"/>
+          <a:chExt cx="0" cy="0"/>
+        </a:xfrm>
+      </p:grpSpPr>
+      <p:sp>
+        <p:nvSpPr>
+          <p:cNvPr id="2" name="Subtitle 2"/>
+          <p:cNvSpPr txBox="1">
+            <a:spLocks/>
+          </p:cNvSpPr>
+          <p:nvPr/>
+        </p:nvSpPr>
+        <p:spPr>
+          <a:xfrm>
+            <a:off x="-192505" y="198725"/>
+            <a:ext cx="8999621" cy="740243"/>
+          </a:xfrm>
+          <a:prstGeom prst="rect">
+            <a:avLst/>
+          </a:prstGeom>
+        </p:spPr>
+        <p:txBody>
+          <a:bodyPr/>
+          <a:lstStyle>
+            <a:lvl1pPr marL="228600" indent="-228600" algn="l" defTabSz="914400" rtl="0" eaLnBrk="1" latinLnBrk="1" hangingPunct="1">
+              <a:lnSpc>
+                <a:spcPct val="90000"/>
+              </a:lnSpc>
+              <a:spcBef>
+                <a:spcPts val="1000"/>
+              </a:spcBef>
+              <a:buFont typeface="Arial" panose="020B0604020202020204" pitchFamily="34" charset="0"/>
+              <a:buChar char="•"/>
+              <a:defRPr sz="2800" kern="1200">
+                <a:solidFill>
+                  <a:schemeClr val="tx1"/>
+                </a:solidFill>
+                <a:latin typeface="+mn-lt"/>
+                <a:ea typeface="+mn-ea"/>
+                <a:cs typeface="+mn-cs"/>
+              </a:defRPr>
+            </a:lvl1pPr>
+            <a:lvl2pPr marL="685800" indent="-228600" algn="l" defTabSz="914400" rtl="0" eaLnBrk="1" latinLnBrk="1" hangingPunct="1">
+              <a:lnSpc>
+                <a:spcPct val="90000"/>
+              </a:lnSpc>
+              <a:spcBef>
+                <a:spcPts val="500"/>
+              </a:spcBef>
+              <a:buFont typeface="Arial" panose="020B0604020202020204" pitchFamily="34" charset="0"/>
+              <a:buChar char="•"/>
+              <a:defRPr sz="2400" kern="1200">
+                <a:solidFill>
+                  <a:schemeClr val="tx1"/>
+                </a:solidFill>
+                <a:latin typeface="+mn-lt"/>
+                <a:ea typeface="+mn-ea"/>
+                <a:cs typeface="+mn-cs"/>
+              </a:defRPr>
+            </a:lvl2pPr>
+            <a:lvl3pPr marL="1143000" indent="-228600" algn="l" defTabSz="914400" rtl="0" eaLnBrk="1" latinLnBrk="1" hangingPunct="1">
+              <a:lnSpc>
+                <a:spcPct val="90000"/>
+              </a:lnSpc>
+              <a:spcBef>
+                <a:spcPts val="500"/>
+              </a:spcBef>
+              <a:buFont typeface="Arial" panose="020B0604020202020204" pitchFamily="34" charset="0"/>
+              <a:buChar char="•"/>
+              <a:defRPr sz="2000" kern="1200">
+                <a:solidFill>
+                  <a:schemeClr val="tx1"/>
+                </a:solidFill>
+                <a:latin typeface="+mn-lt"/>
+                <a:ea typeface="+mn-ea"/>
+                <a:cs typeface="+mn-cs"/>
+              </a:defRPr>
+            </a:lvl3pPr>
+            <a:lvl4pPr marL="1600200" indent="-228600" algn="l" defTabSz="914400" rtl="0" eaLnBrk="1" latinLnBrk="1" hangingPunct="1">
+              <a:lnSpc>
+                <a:spcPct val="90000"/>
+              </a:lnSpc>
+              <a:spcBef>
+                <a:spcPts val="500"/>
+              </a:spcBef>
+              <a:buFont typeface="Arial" panose="020B0604020202020204" pitchFamily="34" charset="0"/>
+              <a:buChar char="•"/>
+              <a:defRPr sz="1800" kern="1200">
+                <a:solidFill>
+                  <a:schemeClr val="tx1"/>
+                </a:solidFill>
+                <a:latin typeface="+mn-lt"/>
+                <a:ea typeface="+mn-ea"/>
+                <a:cs typeface="+mn-cs"/>
+              </a:defRPr>
+            </a:lvl4pPr>
+            <a:lvl5pPr marL="2057400" indent="-228600" algn="l" defTabSz="914400" rtl="0" eaLnBrk="1" latinLnBrk="1" hangingPunct="1">
+              <a:lnSpc>
+                <a:spcPct val="90000"/>
+              </a:lnSpc>
+              <a:spcBef>
+                <a:spcPts val="500"/>
+              </a:spcBef>
+              <a:buFont typeface="Arial" panose="020B0604020202020204" pitchFamily="34" charset="0"/>
+              <a:buChar char="•"/>
+              <a:defRPr sz="1800" kern="1200">
+                <a:solidFill>
+                  <a:schemeClr val="tx1"/>
+                </a:solidFill>
+                <a:latin typeface="+mn-lt"/>
+                <a:ea typeface="+mn-ea"/>
+                <a:cs typeface="+mn-cs"/>
+              </a:defRPr>
+            </a:lvl5pPr>
+            <a:lvl6pPr marL="2514600" indent="-228600" algn="l" defTabSz="914400" rtl="0" eaLnBrk="1" latinLnBrk="1" hangingPunct="1">
+              <a:lnSpc>
+                <a:spcPct val="90000"/>
+              </a:lnSpc>
+              <a:spcBef>
+                <a:spcPts val="500"/>
+              </a:spcBef>
+              <a:buFont typeface="Arial" panose="020B0604020202020204" pitchFamily="34" charset="0"/>
+              <a:buChar char="•"/>
+              <a:defRPr sz="1800" kern="1200">
+                <a:solidFill>
+                  <a:schemeClr val="tx1"/>
+                </a:solidFill>
+                <a:latin typeface="+mn-lt"/>
+                <a:ea typeface="+mn-ea"/>
+                <a:cs typeface="+mn-cs"/>
+              </a:defRPr>
+            </a:lvl6pPr>
+            <a:lvl7pPr marL="2971800" indent="-228600" algn="l" defTabSz="914400" rtl="0" eaLnBrk="1" latinLnBrk="1" hangingPunct="1">
+              <a:lnSpc>
+                <a:spcPct val="90000"/>
+              </a:lnSpc>
+              <a:spcBef>
+                <a:spcPts val="500"/>
+              </a:spcBef>
+              <a:buFont typeface="Arial" panose="020B0604020202020204" pitchFamily="34" charset="0"/>
+              <a:buChar char="•"/>
+              <a:defRPr sz="1800" kern="1200">
+                <a:solidFill>
+                  <a:schemeClr val="tx1"/>
+                </a:solidFill>
+                <a:latin typeface="+mn-lt"/>
+                <a:ea typeface="+mn-ea"/>
+                <a:cs typeface="+mn-cs"/>
+              </a:defRPr>
+            </a:lvl7pPr>
+            <a:lvl8pPr marL="3429000" indent="-228600" algn="l" defTabSz="914400" rtl="0" eaLnBrk="1" latinLnBrk="1" hangingPunct="1">
+              <a:lnSpc>
+                <a:spcPct val="90000"/>
+              </a:lnSpc>
+              <a:spcBef>
+                <a:spcPts val="500"/>
+              </a:spcBef>
+              <a:buFont typeface="Arial" panose="020B0604020202020204" pitchFamily="34" charset="0"/>
+              <a:buChar char="•"/>
+              <a:defRPr sz="1800" kern="1200">
+                <a:solidFill>
+                  <a:schemeClr val="tx1"/>
+                </a:solidFill>
+                <a:latin typeface="+mn-lt"/>
+                <a:ea typeface="+mn-ea"/>
+                <a:cs typeface="+mn-cs"/>
+              </a:defRPr>
+            </a:lvl8pPr>
+            <a:lvl9pPr marL="3886200" indent="-228600" algn="l" defTabSz="914400" rtl="0" eaLnBrk="1" latinLnBrk="1" hangingPunct="1">
+              <a:lnSpc>
+                <a:spcPct val="90000"/>
+              </a:lnSpc>
+              <a:spcBef>
+                <a:spcPts val="500"/>
+              </a:spcBef>
+              <a:buFont typeface="Arial" panose="020B0604020202020204" pitchFamily="34" charset="0"/>
+              <a:buChar char="•"/>
+              <a:defRPr sz="1800" kern="1200">
+                <a:solidFill>
+                  <a:schemeClr val="tx1"/>
+                </a:solidFill>
+                <a:latin typeface="+mn-lt"/>
+                <a:ea typeface="+mn-ea"/>
+                <a:cs typeface="+mn-cs"/>
+              </a:defRPr>
+            </a:lvl9pPr>
+          </a:lstStyle>
+          <a:p>
+            <a:pPr marL="0" indent="0" algn="ctr">
+              <a:buNone/>
+            </a:pPr>
+            <a:r>
+              <a:rPr lang="ko-KR" altLang="en-US" sz="4000" dirty="0" smtClean="0">
+                <a:latin typeface="+mn-ea"/>
+              </a:rPr>
+              <a:t>레이아웃 구성</a:t>
+            </a:r>
+            <a:r>
+              <a:rPr lang="en-US" altLang="ko-KR" sz="4000" dirty="0" smtClean="0">
+                <a:latin typeface="+mn-ea"/>
+              </a:rPr>
+              <a:t>, Intro Page, 3 layout</a:t>
+            </a:r>
+            <a:endParaRPr lang="ko-KR" altLang="en-US" sz="4000" dirty="0">
+              <a:latin typeface="+mn-ea"/>
+            </a:endParaRPr>
+          </a:p>
+        </p:txBody>
+      </p:sp>
+      <p:pic>
+        <p:nvPicPr>
+          <p:cNvPr id="3" name="Picture 2"/>
+          <p:cNvPicPr>
+            <a:picLocks noChangeAspect="1"/>
+          </p:cNvPicPr>
+          <p:nvPr/>
+        </p:nvPicPr>
+        <p:blipFill>
+          <a:blip r:embed="rId2" cstate="print">
+            <a:extLst>
+              <a:ext uri="{28A0092B-C50C-407E-A947-70E740481C1C}">
+                <a14:useLocalDpi xmlns:a14="http://schemas.microsoft.com/office/drawing/2010/main" val="0"/>
+              </a:ext>
+            </a:extLst>
+          </a:blip>
+          <a:stretch>
+            <a:fillRect/>
+          </a:stretch>
+        </p:blipFill>
+        <p:spPr>
+          <a:xfrm>
+            <a:off x="645880" y="1739122"/>
+            <a:ext cx="10609055" cy="4862485"/>
+          </a:xfrm>
+          <a:prstGeom prst="rect">
+            <a:avLst/>
+          </a:prstGeom>
+          <a:ln>
+            <a:solidFill>
+              <a:schemeClr val="tx1"/>
+            </a:solidFill>
+          </a:ln>
+        </p:spPr>
+      </p:pic>
+      <p:sp>
+        <p:nvSpPr>
+          <p:cNvPr id="5" name="TextBox 4"/>
+          <p:cNvSpPr txBox="1"/>
+          <p:nvPr/>
+        </p:nvSpPr>
+        <p:spPr>
+          <a:xfrm>
+            <a:off x="3300847" y="1138990"/>
+            <a:ext cx="5299119" cy="400110"/>
+          </a:xfrm>
+          <a:prstGeom prst="rect">
+            <a:avLst/>
+          </a:prstGeom>
+          <a:noFill/>
+        </p:spPr>
+        <p:txBody>
+          <a:bodyPr wrap="square" rtlCol="0">
+            <a:spAutoFit/>
+          </a:bodyPr>
+          <a:lstStyle/>
+          <a:p>
+            <a:pPr algn="ctr"/>
+            <a:r>
+              <a:rPr lang="en-US" altLang="ko-KR" sz="2000" dirty="0" smtClean="0"/>
+              <a:t>Medium devices ( page width &gt;= 992px)</a:t>
+            </a:r>
+            <a:endParaRPr lang="ko-KR" altLang="en-US" sz="2000" dirty="0"/>
+          </a:p>
+        </p:txBody>
+      </p:sp>
+    </p:spTree>
+    <p:extLst>
+      <p:ext uri="{BB962C8B-B14F-4D97-AF65-F5344CB8AC3E}">
+        <p14:creationId xmlns:p14="http://schemas.microsoft.com/office/powerpoint/2010/main" val="4098584978"/>
+      </p:ext>
+    </p:extLst>
+  </p:cSld>
+  <p:clrMapOvr>
+    <a:masterClrMapping/>
+  </p:clrMapOvr>
+</p:sld>
+</file>
+
+<file path=ppt/slides/slide6.xml><?xml version="1.0" encoding="utf-8"?>
+<p:sld xmlns:a="http://schemas.openxmlformats.org/drawingml/2006/main" xmlns:r="http://schemas.openxmlformats.org/officeDocument/2006/relationships" xmlns:p="http://schemas.openxmlformats.org/presentationml/2006/main">
+  <p:cSld>
+    <p:spTree>
+      <p:nvGrpSpPr>
+        <p:cNvPr id="1" name=""/>
+        <p:cNvGrpSpPr/>
+        <p:nvPr/>
+      </p:nvGrpSpPr>
+      <p:grpSpPr>
+        <a:xfrm>
+          <a:off x="0" y="0"/>
+          <a:ext cx="0" cy="0"/>
+          <a:chOff x="0" y="0"/>
+          <a:chExt cx="0" cy="0"/>
+        </a:xfrm>
+      </p:grpSpPr>
+      <p:sp>
+        <p:nvSpPr>
+          <p:cNvPr id="2" name="Subtitle 2"/>
+          <p:cNvSpPr txBox="1">
+            <a:spLocks/>
+          </p:cNvSpPr>
+          <p:nvPr/>
+        </p:nvSpPr>
+        <p:spPr>
+          <a:xfrm>
+            <a:off x="-192505" y="198725"/>
+            <a:ext cx="8999621" cy="740243"/>
+          </a:xfrm>
+          <a:prstGeom prst="rect">
+            <a:avLst/>
+          </a:prstGeom>
+        </p:spPr>
+        <p:txBody>
+          <a:bodyPr/>
+          <a:lstStyle>
+            <a:lvl1pPr marL="228600" indent="-228600" algn="l" defTabSz="914400" rtl="0" eaLnBrk="1" latinLnBrk="1" hangingPunct="1">
+              <a:lnSpc>
+                <a:spcPct val="90000"/>
+              </a:lnSpc>
+              <a:spcBef>
+                <a:spcPts val="1000"/>
+              </a:spcBef>
+              <a:buFont typeface="Arial" panose="020B0604020202020204" pitchFamily="34" charset="0"/>
+              <a:buChar char="•"/>
+              <a:defRPr sz="2800" kern="1200">
+                <a:solidFill>
+                  <a:schemeClr val="tx1"/>
+                </a:solidFill>
+                <a:latin typeface="+mn-lt"/>
+                <a:ea typeface="+mn-ea"/>
+                <a:cs typeface="+mn-cs"/>
+              </a:defRPr>
+            </a:lvl1pPr>
+            <a:lvl2pPr marL="685800" indent="-228600" algn="l" defTabSz="914400" rtl="0" eaLnBrk="1" latinLnBrk="1" hangingPunct="1">
+              <a:lnSpc>
+                <a:spcPct val="90000"/>
+              </a:lnSpc>
+              <a:spcBef>
+                <a:spcPts val="500"/>
+              </a:spcBef>
+              <a:buFont typeface="Arial" panose="020B0604020202020204" pitchFamily="34" charset="0"/>
+              <a:buChar char="•"/>
+              <a:defRPr sz="2400" kern="1200">
+                <a:solidFill>
+                  <a:schemeClr val="tx1"/>
+                </a:solidFill>
+                <a:latin typeface="+mn-lt"/>
+                <a:ea typeface="+mn-ea"/>
+                <a:cs typeface="+mn-cs"/>
+              </a:defRPr>
+            </a:lvl2pPr>
+            <a:lvl3pPr marL="1143000" indent="-228600" algn="l" defTabSz="914400" rtl="0" eaLnBrk="1" latinLnBrk="1" hangingPunct="1">
+              <a:lnSpc>
+                <a:spcPct val="90000"/>
+              </a:lnSpc>
+              <a:spcBef>
+                <a:spcPts val="500"/>
+              </a:spcBef>
+              <a:buFont typeface="Arial" panose="020B0604020202020204" pitchFamily="34" charset="0"/>
+              <a:buChar char="•"/>
+              <a:defRPr sz="2000" kern="1200">
+                <a:solidFill>
+                  <a:schemeClr val="tx1"/>
+                </a:solidFill>
+                <a:latin typeface="+mn-lt"/>
+                <a:ea typeface="+mn-ea"/>
+                <a:cs typeface="+mn-cs"/>
+              </a:defRPr>
+            </a:lvl3pPr>
+            <a:lvl4pPr marL="1600200" indent="-228600" algn="l" defTabSz="914400" rtl="0" eaLnBrk="1" latinLnBrk="1" hangingPunct="1">
+              <a:lnSpc>
+                <a:spcPct val="90000"/>
+              </a:lnSpc>
+              <a:spcBef>
+                <a:spcPts val="500"/>
+              </a:spcBef>
+              <a:buFont typeface="Arial" panose="020B0604020202020204" pitchFamily="34" charset="0"/>
+              <a:buChar char="•"/>
+              <a:defRPr sz="1800" kern="1200">
+                <a:solidFill>
+                  <a:schemeClr val="tx1"/>
+                </a:solidFill>
+                <a:latin typeface="+mn-lt"/>
+                <a:ea typeface="+mn-ea"/>
+                <a:cs typeface="+mn-cs"/>
+              </a:defRPr>
+            </a:lvl4pPr>
+            <a:lvl5pPr marL="2057400" indent="-228600" algn="l" defTabSz="914400" rtl="0" eaLnBrk="1" latinLnBrk="1" hangingPunct="1">
+              <a:lnSpc>
+                <a:spcPct val="90000"/>
+              </a:lnSpc>
+              <a:spcBef>
+                <a:spcPts val="500"/>
+              </a:spcBef>
+              <a:buFont typeface="Arial" panose="020B0604020202020204" pitchFamily="34" charset="0"/>
+              <a:buChar char="•"/>
+              <a:defRPr sz="1800" kern="1200">
+                <a:solidFill>
+                  <a:schemeClr val="tx1"/>
+                </a:solidFill>
+                <a:latin typeface="+mn-lt"/>
+                <a:ea typeface="+mn-ea"/>
+                <a:cs typeface="+mn-cs"/>
+              </a:defRPr>
+            </a:lvl5pPr>
+            <a:lvl6pPr marL="2514600" indent="-228600" algn="l" defTabSz="914400" rtl="0" eaLnBrk="1" latinLnBrk="1" hangingPunct="1">
+              <a:lnSpc>
+                <a:spcPct val="90000"/>
+              </a:lnSpc>
+              <a:spcBef>
+                <a:spcPts val="500"/>
+              </a:spcBef>
+              <a:buFont typeface="Arial" panose="020B0604020202020204" pitchFamily="34" charset="0"/>
+              <a:buChar char="•"/>
+              <a:defRPr sz="1800" kern="1200">
+                <a:solidFill>
+                  <a:schemeClr val="tx1"/>
+                </a:solidFill>
+                <a:latin typeface="+mn-lt"/>
+                <a:ea typeface="+mn-ea"/>
+                <a:cs typeface="+mn-cs"/>
+              </a:defRPr>
+            </a:lvl6pPr>
+            <a:lvl7pPr marL="2971800" indent="-228600" algn="l" defTabSz="914400" rtl="0" eaLnBrk="1" latinLnBrk="1" hangingPunct="1">
+              <a:lnSpc>
+                <a:spcPct val="90000"/>
+              </a:lnSpc>
+              <a:spcBef>
+                <a:spcPts val="500"/>
+              </a:spcBef>
+              <a:buFont typeface="Arial" panose="020B0604020202020204" pitchFamily="34" charset="0"/>
+              <a:buChar char="•"/>
+              <a:defRPr sz="1800" kern="1200">
+                <a:solidFill>
+                  <a:schemeClr val="tx1"/>
+                </a:solidFill>
+                <a:latin typeface="+mn-lt"/>
+                <a:ea typeface="+mn-ea"/>
+                <a:cs typeface="+mn-cs"/>
+              </a:defRPr>
+            </a:lvl7pPr>
+            <a:lvl8pPr marL="3429000" indent="-228600" algn="l" defTabSz="914400" rtl="0" eaLnBrk="1" latinLnBrk="1" hangingPunct="1">
+              <a:lnSpc>
+                <a:spcPct val="90000"/>
+              </a:lnSpc>
+              <a:spcBef>
+                <a:spcPts val="500"/>
+              </a:spcBef>
+              <a:buFont typeface="Arial" panose="020B0604020202020204" pitchFamily="34" charset="0"/>
+              <a:buChar char="•"/>
+              <a:defRPr sz="1800" kern="1200">
+                <a:solidFill>
+                  <a:schemeClr val="tx1"/>
+                </a:solidFill>
+                <a:latin typeface="+mn-lt"/>
+                <a:ea typeface="+mn-ea"/>
+                <a:cs typeface="+mn-cs"/>
+              </a:defRPr>
+            </a:lvl8pPr>
+            <a:lvl9pPr marL="3886200" indent="-228600" algn="l" defTabSz="914400" rtl="0" eaLnBrk="1" latinLnBrk="1" hangingPunct="1">
+              <a:lnSpc>
+                <a:spcPct val="90000"/>
+              </a:lnSpc>
+              <a:spcBef>
+                <a:spcPts val="500"/>
+              </a:spcBef>
+              <a:buFont typeface="Arial" panose="020B0604020202020204" pitchFamily="34" charset="0"/>
+              <a:buChar char="•"/>
+              <a:defRPr sz="1800" kern="1200">
+                <a:solidFill>
+                  <a:schemeClr val="tx1"/>
+                </a:solidFill>
+                <a:latin typeface="+mn-lt"/>
+                <a:ea typeface="+mn-ea"/>
+                <a:cs typeface="+mn-cs"/>
+              </a:defRPr>
+            </a:lvl9pPr>
+          </a:lstStyle>
+          <a:p>
+            <a:pPr marL="0" indent="0" algn="ctr">
+              <a:buNone/>
+            </a:pPr>
+            <a:r>
+              <a:rPr lang="ko-KR" altLang="en-US" sz="4000" dirty="0" smtClean="0">
+                <a:latin typeface="+mn-ea"/>
+              </a:rPr>
+              <a:t>레이아웃 구성</a:t>
+            </a:r>
+            <a:r>
+              <a:rPr lang="en-US" altLang="ko-KR" sz="4000" dirty="0" smtClean="0">
+                <a:latin typeface="+mn-ea"/>
+              </a:rPr>
+              <a:t>, Intro Page, 3 layout</a:t>
+            </a:r>
+            <a:endParaRPr lang="ko-KR" altLang="en-US" sz="4000" dirty="0">
+              <a:latin typeface="+mn-ea"/>
+            </a:endParaRPr>
+          </a:p>
+        </p:txBody>
+      </p:sp>
+      <p:sp>
+        <p:nvSpPr>
+          <p:cNvPr id="5" name="TextBox 4"/>
+          <p:cNvSpPr txBox="1"/>
+          <p:nvPr/>
+        </p:nvSpPr>
+        <p:spPr>
+          <a:xfrm>
+            <a:off x="2971984" y="1138990"/>
+            <a:ext cx="5956845" cy="400110"/>
+          </a:xfrm>
+          <a:prstGeom prst="rect">
+            <a:avLst/>
+          </a:prstGeom>
+          <a:noFill/>
+        </p:spPr>
+        <p:txBody>
+          <a:bodyPr wrap="square" rtlCol="0">
+            <a:spAutoFit/>
+          </a:bodyPr>
+          <a:lstStyle/>
+          <a:p>
+            <a:pPr algn="ctr"/>
+            <a:r>
+              <a:rPr lang="en-US" altLang="ko-KR" sz="2000" dirty="0" smtClean="0"/>
+              <a:t>Small devices ( 992px &gt; page width &gt;= 768px)</a:t>
+            </a:r>
+            <a:endParaRPr lang="ko-KR" altLang="en-US" sz="2000" dirty="0"/>
+          </a:p>
+        </p:txBody>
+      </p:sp>
+      <p:pic>
+        <p:nvPicPr>
+          <p:cNvPr id="6" name="Picture 5"/>
+          <p:cNvPicPr>
+            <a:picLocks noChangeAspect="1"/>
+          </p:cNvPicPr>
+          <p:nvPr/>
+        </p:nvPicPr>
+        <p:blipFill>
+          <a:blip r:embed="rId2" cstate="print">
+            <a:extLst>
+              <a:ext uri="{28A0092B-C50C-407E-A947-70E740481C1C}">
+                <a14:useLocalDpi xmlns:a14="http://schemas.microsoft.com/office/drawing/2010/main" val="0"/>
+              </a:ext>
+            </a:extLst>
+          </a:blip>
+          <a:stretch>
+            <a:fillRect/>
+          </a:stretch>
+        </p:blipFill>
+        <p:spPr>
+          <a:xfrm>
+            <a:off x="2555410" y="1739122"/>
+            <a:ext cx="7214232" cy="4705294"/>
+          </a:xfrm>
+          <a:prstGeom prst="rect">
+            <a:avLst/>
+          </a:prstGeom>
+          <a:ln>
+            <a:solidFill>
+              <a:schemeClr val="tx1"/>
+            </a:solidFill>
+          </a:ln>
+        </p:spPr>
+      </p:pic>
+    </p:spTree>
+    <p:extLst>
+      <p:ext uri="{BB962C8B-B14F-4D97-AF65-F5344CB8AC3E}">
+        <p14:creationId xmlns:p14="http://schemas.microsoft.com/office/powerpoint/2010/main" val="2991260706"/>
+      </p:ext>
+    </p:extLst>
+  </p:cSld>
+  <p:clrMapOvr>
+    <a:masterClrMapping/>
+  </p:clrMapOvr>
+</p:sld>
+</file>
+
+<file path=ppt/slides/slide7.xml><?xml version="1.0" encoding="utf-8"?>
+<p:sld xmlns:a="http://schemas.openxmlformats.org/drawingml/2006/main" xmlns:r="http://schemas.openxmlformats.org/officeDocument/2006/relationships" xmlns:p="http://schemas.openxmlformats.org/presentationml/2006/main">
+  <p:cSld>
+    <p:spTree>
+      <p:nvGrpSpPr>
+        <p:cNvPr id="1" name=""/>
+        <p:cNvGrpSpPr/>
+        <p:nvPr/>
+      </p:nvGrpSpPr>
+      <p:grpSpPr>
+        <a:xfrm>
+          <a:off x="0" y="0"/>
+          <a:ext cx="0" cy="0"/>
+          <a:chOff x="0" y="0"/>
+          <a:chExt cx="0" cy="0"/>
+        </a:xfrm>
+      </p:grpSpPr>
+      <p:sp>
+        <p:nvSpPr>
+          <p:cNvPr id="2" name="Subtitle 2"/>
+          <p:cNvSpPr txBox="1">
+            <a:spLocks/>
+          </p:cNvSpPr>
+          <p:nvPr/>
+        </p:nvSpPr>
+        <p:spPr>
+          <a:xfrm>
+            <a:off x="-192505" y="198725"/>
+            <a:ext cx="8999621" cy="740243"/>
+          </a:xfrm>
+          <a:prstGeom prst="rect">
+            <a:avLst/>
+          </a:prstGeom>
+        </p:spPr>
+        <p:txBody>
+          <a:bodyPr/>
+          <a:lstStyle>
+            <a:lvl1pPr marL="228600" indent="-228600" algn="l" defTabSz="914400" rtl="0" eaLnBrk="1" latinLnBrk="1" hangingPunct="1">
+              <a:lnSpc>
+                <a:spcPct val="90000"/>
+              </a:lnSpc>
+              <a:spcBef>
+                <a:spcPts val="1000"/>
+              </a:spcBef>
+              <a:buFont typeface="Arial" panose="020B0604020202020204" pitchFamily="34" charset="0"/>
+              <a:buChar char="•"/>
+              <a:defRPr sz="2800" kern="1200">
+                <a:solidFill>
+                  <a:schemeClr val="tx1"/>
+                </a:solidFill>
+                <a:latin typeface="+mn-lt"/>
+                <a:ea typeface="+mn-ea"/>
+                <a:cs typeface="+mn-cs"/>
+              </a:defRPr>
+            </a:lvl1pPr>
+            <a:lvl2pPr marL="685800" indent="-228600" algn="l" defTabSz="914400" rtl="0" eaLnBrk="1" latinLnBrk="1" hangingPunct="1">
+              <a:lnSpc>
+                <a:spcPct val="90000"/>
+              </a:lnSpc>
+              <a:spcBef>
+                <a:spcPts val="500"/>
+              </a:spcBef>
+              <a:buFont typeface="Arial" panose="020B0604020202020204" pitchFamily="34" charset="0"/>
+              <a:buChar char="•"/>
+              <a:defRPr sz="2400" kern="1200">
+                <a:solidFill>
+                  <a:schemeClr val="tx1"/>
+                </a:solidFill>
+                <a:latin typeface="+mn-lt"/>
+                <a:ea typeface="+mn-ea"/>
+                <a:cs typeface="+mn-cs"/>
+              </a:defRPr>
+            </a:lvl2pPr>
+            <a:lvl3pPr marL="1143000" indent="-228600" algn="l" defTabSz="914400" rtl="0" eaLnBrk="1" latinLnBrk="1" hangingPunct="1">
+              <a:lnSpc>
+                <a:spcPct val="90000"/>
+              </a:lnSpc>
+              <a:spcBef>
+                <a:spcPts val="500"/>
+              </a:spcBef>
+              <a:buFont typeface="Arial" panose="020B0604020202020204" pitchFamily="34" charset="0"/>
+              <a:buChar char="•"/>
+              <a:defRPr sz="2000" kern="1200">
+                <a:solidFill>
+                  <a:schemeClr val="tx1"/>
+                </a:solidFill>
+                <a:latin typeface="+mn-lt"/>
+                <a:ea typeface="+mn-ea"/>
+                <a:cs typeface="+mn-cs"/>
+              </a:defRPr>
+            </a:lvl3pPr>
+            <a:lvl4pPr marL="1600200" indent="-228600" algn="l" defTabSz="914400" rtl="0" eaLnBrk="1" latinLnBrk="1" hangingPunct="1">
+              <a:lnSpc>
+                <a:spcPct val="90000"/>
+              </a:lnSpc>
+              <a:spcBef>
+                <a:spcPts val="500"/>
+              </a:spcBef>
+              <a:buFont typeface="Arial" panose="020B0604020202020204" pitchFamily="34" charset="0"/>
+              <a:buChar char="•"/>
+              <a:defRPr sz="1800" kern="1200">
+                <a:solidFill>
+                  <a:schemeClr val="tx1"/>
+                </a:solidFill>
+                <a:latin typeface="+mn-lt"/>
+                <a:ea typeface="+mn-ea"/>
+                <a:cs typeface="+mn-cs"/>
+              </a:defRPr>
+            </a:lvl4pPr>
+            <a:lvl5pPr marL="2057400" indent="-228600" algn="l" defTabSz="914400" rtl="0" eaLnBrk="1" latinLnBrk="1" hangingPunct="1">
+              <a:lnSpc>
+                <a:spcPct val="90000"/>
+              </a:lnSpc>
+              <a:spcBef>
+                <a:spcPts val="500"/>
+              </a:spcBef>
+              <a:buFont typeface="Arial" panose="020B0604020202020204" pitchFamily="34" charset="0"/>
+              <a:buChar char="•"/>
+              <a:defRPr sz="1800" kern="1200">
+                <a:solidFill>
+                  <a:schemeClr val="tx1"/>
+                </a:solidFill>
+                <a:latin typeface="+mn-lt"/>
+                <a:ea typeface="+mn-ea"/>
+                <a:cs typeface="+mn-cs"/>
+              </a:defRPr>
+            </a:lvl5pPr>
+            <a:lvl6pPr marL="2514600" indent="-228600" algn="l" defTabSz="914400" rtl="0" eaLnBrk="1" latinLnBrk="1" hangingPunct="1">
+              <a:lnSpc>
+                <a:spcPct val="90000"/>
+              </a:lnSpc>
+              <a:spcBef>
+                <a:spcPts val="500"/>
+              </a:spcBef>
+              <a:buFont typeface="Arial" panose="020B0604020202020204" pitchFamily="34" charset="0"/>
+              <a:buChar char="•"/>
+              <a:defRPr sz="1800" kern="1200">
+                <a:solidFill>
+                  <a:schemeClr val="tx1"/>
+                </a:solidFill>
+                <a:latin typeface="+mn-lt"/>
+                <a:ea typeface="+mn-ea"/>
+                <a:cs typeface="+mn-cs"/>
+              </a:defRPr>
+            </a:lvl6pPr>
+            <a:lvl7pPr marL="2971800" indent="-228600" algn="l" defTabSz="914400" rtl="0" eaLnBrk="1" latinLnBrk="1" hangingPunct="1">
+              <a:lnSpc>
+                <a:spcPct val="90000"/>
+              </a:lnSpc>
+              <a:spcBef>
+                <a:spcPts val="500"/>
+              </a:spcBef>
+              <a:buFont typeface="Arial" panose="020B0604020202020204" pitchFamily="34" charset="0"/>
+              <a:buChar char="•"/>
+              <a:defRPr sz="1800" kern="1200">
+                <a:solidFill>
+                  <a:schemeClr val="tx1"/>
+                </a:solidFill>
+                <a:latin typeface="+mn-lt"/>
+                <a:ea typeface="+mn-ea"/>
+                <a:cs typeface="+mn-cs"/>
+              </a:defRPr>
+            </a:lvl7pPr>
+            <a:lvl8pPr marL="3429000" indent="-228600" algn="l" defTabSz="914400" rtl="0" eaLnBrk="1" latinLnBrk="1" hangingPunct="1">
+              <a:lnSpc>
+                <a:spcPct val="90000"/>
+              </a:lnSpc>
+              <a:spcBef>
+                <a:spcPts val="500"/>
+              </a:spcBef>
+              <a:buFont typeface="Arial" panose="020B0604020202020204" pitchFamily="34" charset="0"/>
+              <a:buChar char="•"/>
+              <a:defRPr sz="1800" kern="1200">
+                <a:solidFill>
+                  <a:schemeClr val="tx1"/>
+                </a:solidFill>
+                <a:latin typeface="+mn-lt"/>
+                <a:ea typeface="+mn-ea"/>
+                <a:cs typeface="+mn-cs"/>
+              </a:defRPr>
+            </a:lvl8pPr>
+            <a:lvl9pPr marL="3886200" indent="-228600" algn="l" defTabSz="914400" rtl="0" eaLnBrk="1" latinLnBrk="1" hangingPunct="1">
+              <a:lnSpc>
+                <a:spcPct val="90000"/>
+              </a:lnSpc>
+              <a:spcBef>
+                <a:spcPts val="500"/>
+              </a:spcBef>
+              <a:buFont typeface="Arial" panose="020B0604020202020204" pitchFamily="34" charset="0"/>
+              <a:buChar char="•"/>
+              <a:defRPr sz="1800" kern="1200">
+                <a:solidFill>
+                  <a:schemeClr val="tx1"/>
+                </a:solidFill>
+                <a:latin typeface="+mn-lt"/>
+                <a:ea typeface="+mn-ea"/>
+                <a:cs typeface="+mn-cs"/>
+              </a:defRPr>
+            </a:lvl9pPr>
+          </a:lstStyle>
+          <a:p>
+            <a:pPr marL="0" indent="0" algn="ctr">
+              <a:buNone/>
+            </a:pPr>
+            <a:r>
+              <a:rPr lang="ko-KR" altLang="en-US" sz="4000" dirty="0" smtClean="0">
+                <a:latin typeface="+mn-ea"/>
+              </a:rPr>
+              <a:t>레이아웃 구성</a:t>
+            </a:r>
+            <a:r>
+              <a:rPr lang="en-US" altLang="ko-KR" sz="4000" dirty="0" smtClean="0">
+                <a:latin typeface="+mn-ea"/>
+              </a:rPr>
+              <a:t>, Intro Page, 3 layout</a:t>
+            </a:r>
+            <a:endParaRPr lang="ko-KR" altLang="en-US" sz="4000" dirty="0">
+              <a:latin typeface="+mn-ea"/>
+            </a:endParaRPr>
+          </a:p>
+        </p:txBody>
+      </p:sp>
+      <p:sp>
+        <p:nvSpPr>
+          <p:cNvPr id="5" name="TextBox 4"/>
+          <p:cNvSpPr txBox="1"/>
+          <p:nvPr/>
+        </p:nvSpPr>
+        <p:spPr>
+          <a:xfrm>
+            <a:off x="2378426" y="938968"/>
+            <a:ext cx="7375174" cy="400110"/>
+          </a:xfrm>
+          <a:prstGeom prst="rect">
+            <a:avLst/>
+          </a:prstGeom>
+          <a:noFill/>
+        </p:spPr>
+        <p:txBody>
+          <a:bodyPr wrap="square" rtlCol="0">
+            <a:spAutoFit/>
+          </a:bodyPr>
+          <a:lstStyle/>
+          <a:p>
+            <a:pPr algn="ctr"/>
+            <a:r>
+              <a:rPr lang="en-US" altLang="ko-KR" sz="2000" dirty="0" smtClean="0"/>
+              <a:t>Extra small devices ( 768px &gt; page width)</a:t>
+            </a:r>
+            <a:endParaRPr lang="ko-KR" altLang="en-US" sz="2000" dirty="0"/>
+          </a:p>
+        </p:txBody>
+      </p:sp>
+      <p:pic>
+        <p:nvPicPr>
+          <p:cNvPr id="6" name="Picture 5"/>
+          <p:cNvPicPr>
+            <a:picLocks noChangeAspect="1"/>
+          </p:cNvPicPr>
+          <p:nvPr/>
+        </p:nvPicPr>
+        <p:blipFill>
+          <a:blip r:embed="rId2" cstate="print">
+            <a:extLst>
+              <a:ext uri="{28A0092B-C50C-407E-A947-70E740481C1C}">
+                <a14:useLocalDpi xmlns:a14="http://schemas.microsoft.com/office/drawing/2010/main" val="0"/>
+              </a:ext>
+            </a:extLst>
+          </a:blip>
+          <a:stretch>
+            <a:fillRect/>
+          </a:stretch>
+        </p:blipFill>
+        <p:spPr>
+          <a:xfrm>
+            <a:off x="4309402" y="1486706"/>
+            <a:ext cx="3551230" cy="5015564"/>
+          </a:xfrm>
+          <a:prstGeom prst="rect">
+            <a:avLst/>
+          </a:prstGeom>
+          <a:ln>
+            <a:solidFill>
+              <a:schemeClr val="tx1"/>
+            </a:solidFill>
+          </a:ln>
+        </p:spPr>
+      </p:pic>
+    </p:spTree>
+    <p:extLst>
+      <p:ext uri="{BB962C8B-B14F-4D97-AF65-F5344CB8AC3E}">
+        <p14:creationId xmlns:p14="http://schemas.microsoft.com/office/powerpoint/2010/main" val="2222836405"/>
+      </p:ext>
+    </p:extLst>
+  </p:cSld>
+  <p:clrMapOvr>
+    <a:masterClrMapping/>
+  </p:clrMapOvr>
+</p:sld>
+</file>
+
+<file path=ppt/slides/slide8.xml><?xml version="1.0" encoding="utf-8"?>
+<p:sld xmlns:a="http://schemas.openxmlformats.org/drawingml/2006/main" xmlns:r="http://schemas.openxmlformats.org/officeDocument/2006/relationships" xmlns:p="http://schemas.openxmlformats.org/presentationml/2006/main">
+  <p:cSld>
+    <p:spTree>
+      <p:nvGrpSpPr>
+        <p:cNvPr id="1" name=""/>
+        <p:cNvGrpSpPr/>
+        <p:nvPr/>
+      </p:nvGrpSpPr>
+      <p:grpSpPr>
+        <a:xfrm>
+          <a:off x="0" y="0"/>
+          <a:ext cx="0" cy="0"/>
+          <a:chOff x="0" y="0"/>
+          <a:chExt cx="0" cy="0"/>
+        </a:xfrm>
+      </p:grpSpPr>
+    </p:spTree>
+    <p:extLst>
+      <p:ext uri="{BB962C8B-B14F-4D97-AF65-F5344CB8AC3E}">
+        <p14:creationId xmlns:p14="http://schemas.microsoft.com/office/powerpoint/2010/main" val="3604890299"/>
       </p:ext>
     </p:extLst>
   </p:cSld>

</xml_diff>

<commit_message>
fix some ppt slide
</commit_message>
<xml_diff>
--- a/project_doc_201611263_박성호.pptx
+++ b/project_doc_201611263_박성호.pptx
@@ -5903,8 +5903,8 @@
         </p:nvSpPr>
         <p:spPr>
           <a:xfrm>
-            <a:off x="994191" y="2490171"/>
-            <a:ext cx="10475913" cy="4309764"/>
+            <a:off x="870194" y="2434187"/>
+            <a:ext cx="10427367" cy="4309764"/>
           </a:xfrm>
           <a:prstGeom prst="rect">
             <a:avLst/>
@@ -6102,7 +6102,13 @@
               <a:rPr lang="ko-KR" altLang="en-US" sz="2000" dirty="0" smtClean="0">
                 <a:latin typeface="+mn-ea"/>
               </a:rPr>
-              <a:t>에 저장</a:t>
+              <a:t>에 </a:t>
+            </a:r>
+            <a:r>
+              <a:rPr lang="ko-KR" altLang="en-US" sz="2000" dirty="0" smtClean="0">
+                <a:latin typeface="+mn-ea"/>
+              </a:rPr>
+              <a:t>저장</a:t>
             </a:r>
             <a:endParaRPr lang="en-US" altLang="ko-KR" sz="2000" dirty="0" smtClean="0"/>
           </a:p>
@@ -7774,6 +7780,253 @@
           </a:p>
         </p:txBody>
       </p:sp>
+      <p:sp>
+        <p:nvSpPr>
+          <p:cNvPr id="10" name="Subtitle 2"/>
+          <p:cNvSpPr txBox="1">
+            <a:spLocks/>
+          </p:cNvSpPr>
+          <p:nvPr/>
+        </p:nvSpPr>
+        <p:spPr>
+          <a:xfrm>
+            <a:off x="7539793" y="455803"/>
+            <a:ext cx="4652207" cy="1771547"/>
+          </a:xfrm>
+          <a:prstGeom prst="rect">
+            <a:avLst/>
+          </a:prstGeom>
+        </p:spPr>
+        <p:txBody>
+          <a:bodyPr/>
+          <a:lstStyle>
+            <a:lvl1pPr marL="228600" indent="-228600" algn="l" defTabSz="914400" rtl="0" eaLnBrk="1" latinLnBrk="1" hangingPunct="1">
+              <a:lnSpc>
+                <a:spcPct val="90000"/>
+              </a:lnSpc>
+              <a:spcBef>
+                <a:spcPts val="1000"/>
+              </a:spcBef>
+              <a:buFont typeface="Arial" panose="020B0604020202020204" pitchFamily="34" charset="0"/>
+              <a:buChar char="•"/>
+              <a:defRPr sz="2800" kern="1200">
+                <a:solidFill>
+                  <a:schemeClr val="tx1"/>
+                </a:solidFill>
+                <a:latin typeface="+mn-lt"/>
+                <a:ea typeface="+mn-ea"/>
+                <a:cs typeface="+mn-cs"/>
+              </a:defRPr>
+            </a:lvl1pPr>
+            <a:lvl2pPr marL="685800" indent="-228600" algn="l" defTabSz="914400" rtl="0" eaLnBrk="1" latinLnBrk="1" hangingPunct="1">
+              <a:lnSpc>
+                <a:spcPct val="90000"/>
+              </a:lnSpc>
+              <a:spcBef>
+                <a:spcPts val="500"/>
+              </a:spcBef>
+              <a:buFont typeface="Arial" panose="020B0604020202020204" pitchFamily="34" charset="0"/>
+              <a:buChar char="•"/>
+              <a:defRPr sz="2400" kern="1200">
+                <a:solidFill>
+                  <a:schemeClr val="tx1"/>
+                </a:solidFill>
+                <a:latin typeface="+mn-lt"/>
+                <a:ea typeface="+mn-ea"/>
+                <a:cs typeface="+mn-cs"/>
+              </a:defRPr>
+            </a:lvl2pPr>
+            <a:lvl3pPr marL="1143000" indent="-228600" algn="l" defTabSz="914400" rtl="0" eaLnBrk="1" latinLnBrk="1" hangingPunct="1">
+              <a:lnSpc>
+                <a:spcPct val="90000"/>
+              </a:lnSpc>
+              <a:spcBef>
+                <a:spcPts val="500"/>
+              </a:spcBef>
+              <a:buFont typeface="Arial" panose="020B0604020202020204" pitchFamily="34" charset="0"/>
+              <a:buChar char="•"/>
+              <a:defRPr sz="2000" kern="1200">
+                <a:solidFill>
+                  <a:schemeClr val="tx1"/>
+                </a:solidFill>
+                <a:latin typeface="+mn-lt"/>
+                <a:ea typeface="+mn-ea"/>
+                <a:cs typeface="+mn-cs"/>
+              </a:defRPr>
+            </a:lvl3pPr>
+            <a:lvl4pPr marL="1600200" indent="-228600" algn="l" defTabSz="914400" rtl="0" eaLnBrk="1" latinLnBrk="1" hangingPunct="1">
+              <a:lnSpc>
+                <a:spcPct val="90000"/>
+              </a:lnSpc>
+              <a:spcBef>
+                <a:spcPts val="500"/>
+              </a:spcBef>
+              <a:buFont typeface="Arial" panose="020B0604020202020204" pitchFamily="34" charset="0"/>
+              <a:buChar char="•"/>
+              <a:defRPr sz="1800" kern="1200">
+                <a:solidFill>
+                  <a:schemeClr val="tx1"/>
+                </a:solidFill>
+                <a:latin typeface="+mn-lt"/>
+                <a:ea typeface="+mn-ea"/>
+                <a:cs typeface="+mn-cs"/>
+              </a:defRPr>
+            </a:lvl4pPr>
+            <a:lvl5pPr marL="2057400" indent="-228600" algn="l" defTabSz="914400" rtl="0" eaLnBrk="1" latinLnBrk="1" hangingPunct="1">
+              <a:lnSpc>
+                <a:spcPct val="90000"/>
+              </a:lnSpc>
+              <a:spcBef>
+                <a:spcPts val="500"/>
+              </a:spcBef>
+              <a:buFont typeface="Arial" panose="020B0604020202020204" pitchFamily="34" charset="0"/>
+              <a:buChar char="•"/>
+              <a:defRPr sz="1800" kern="1200">
+                <a:solidFill>
+                  <a:schemeClr val="tx1"/>
+                </a:solidFill>
+                <a:latin typeface="+mn-lt"/>
+                <a:ea typeface="+mn-ea"/>
+                <a:cs typeface="+mn-cs"/>
+              </a:defRPr>
+            </a:lvl5pPr>
+            <a:lvl6pPr marL="2514600" indent="-228600" algn="l" defTabSz="914400" rtl="0" eaLnBrk="1" latinLnBrk="1" hangingPunct="1">
+              <a:lnSpc>
+                <a:spcPct val="90000"/>
+              </a:lnSpc>
+              <a:spcBef>
+                <a:spcPts val="500"/>
+              </a:spcBef>
+              <a:buFont typeface="Arial" panose="020B0604020202020204" pitchFamily="34" charset="0"/>
+              <a:buChar char="•"/>
+              <a:defRPr sz="1800" kern="1200">
+                <a:solidFill>
+                  <a:schemeClr val="tx1"/>
+                </a:solidFill>
+                <a:latin typeface="+mn-lt"/>
+                <a:ea typeface="+mn-ea"/>
+                <a:cs typeface="+mn-cs"/>
+              </a:defRPr>
+            </a:lvl6pPr>
+            <a:lvl7pPr marL="2971800" indent="-228600" algn="l" defTabSz="914400" rtl="0" eaLnBrk="1" latinLnBrk="1" hangingPunct="1">
+              <a:lnSpc>
+                <a:spcPct val="90000"/>
+              </a:lnSpc>
+              <a:spcBef>
+                <a:spcPts val="500"/>
+              </a:spcBef>
+              <a:buFont typeface="Arial" panose="020B0604020202020204" pitchFamily="34" charset="0"/>
+              <a:buChar char="•"/>
+              <a:defRPr sz="1800" kern="1200">
+                <a:solidFill>
+                  <a:schemeClr val="tx1"/>
+                </a:solidFill>
+                <a:latin typeface="+mn-lt"/>
+                <a:ea typeface="+mn-ea"/>
+                <a:cs typeface="+mn-cs"/>
+              </a:defRPr>
+            </a:lvl7pPr>
+            <a:lvl8pPr marL="3429000" indent="-228600" algn="l" defTabSz="914400" rtl="0" eaLnBrk="1" latinLnBrk="1" hangingPunct="1">
+              <a:lnSpc>
+                <a:spcPct val="90000"/>
+              </a:lnSpc>
+              <a:spcBef>
+                <a:spcPts val="500"/>
+              </a:spcBef>
+              <a:buFont typeface="Arial" panose="020B0604020202020204" pitchFamily="34" charset="0"/>
+              <a:buChar char="•"/>
+              <a:defRPr sz="1800" kern="1200">
+                <a:solidFill>
+                  <a:schemeClr val="tx1"/>
+                </a:solidFill>
+                <a:latin typeface="+mn-lt"/>
+                <a:ea typeface="+mn-ea"/>
+                <a:cs typeface="+mn-cs"/>
+              </a:defRPr>
+            </a:lvl8pPr>
+            <a:lvl9pPr marL="3886200" indent="-228600" algn="l" defTabSz="914400" rtl="0" eaLnBrk="1" latinLnBrk="1" hangingPunct="1">
+              <a:lnSpc>
+                <a:spcPct val="90000"/>
+              </a:lnSpc>
+              <a:spcBef>
+                <a:spcPts val="500"/>
+              </a:spcBef>
+              <a:buFont typeface="Arial" panose="020B0604020202020204" pitchFamily="34" charset="0"/>
+              <a:buChar char="•"/>
+              <a:defRPr sz="1800" kern="1200">
+                <a:solidFill>
+                  <a:schemeClr val="tx1"/>
+                </a:solidFill>
+                <a:latin typeface="+mn-lt"/>
+                <a:ea typeface="+mn-ea"/>
+                <a:cs typeface="+mn-cs"/>
+              </a:defRPr>
+            </a:lvl9pPr>
+          </a:lstStyle>
+          <a:p>
+            <a:pPr marL="0" indent="0">
+              <a:buNone/>
+            </a:pPr>
+            <a:r>
+              <a:rPr lang="ko-KR" altLang="en-US" sz="2400" dirty="0" smtClean="0">
+                <a:latin typeface="+mn-ea"/>
+              </a:rPr>
+              <a:t>사진</a:t>
+            </a:r>
+            <a:r>
+              <a:rPr lang="en-US" altLang="ko-KR" sz="2400" dirty="0" smtClean="0">
+                <a:latin typeface="+mn-ea"/>
+              </a:rPr>
+              <a:t>, </a:t>
+            </a:r>
+            <a:r>
+              <a:rPr lang="ko-KR" altLang="en-US" sz="2400" dirty="0" smtClean="0">
+                <a:latin typeface="+mn-ea"/>
+              </a:rPr>
+              <a:t>비디오</a:t>
+            </a:r>
+            <a:r>
+              <a:rPr lang="en-US" altLang="ko-KR" sz="2400" dirty="0" smtClean="0">
+                <a:latin typeface="+mn-ea"/>
+              </a:rPr>
+              <a:t>, </a:t>
+            </a:r>
+            <a:r>
+              <a:rPr lang="ko-KR" altLang="en-US" sz="2400" dirty="0" smtClean="0">
+                <a:latin typeface="+mn-ea"/>
+              </a:rPr>
+              <a:t>일반 </a:t>
+            </a:r>
+            <a:r>
+              <a:rPr lang="ko-KR" altLang="en-US" sz="2400" dirty="0" smtClean="0">
+                <a:latin typeface="+mn-ea"/>
+              </a:rPr>
+              <a:t>파일이 이미 스토리지에 저장된 상태에서 글을 수정하되</a:t>
+            </a:r>
+            <a:r>
+              <a:rPr lang="en-US" altLang="ko-KR" sz="2400" dirty="0" smtClean="0">
+                <a:latin typeface="+mn-ea"/>
+              </a:rPr>
+              <a:t>, </a:t>
+            </a:r>
+            <a:r>
+              <a:rPr lang="ko-KR" altLang="en-US" sz="2400" dirty="0" smtClean="0">
+                <a:latin typeface="+mn-ea"/>
+              </a:rPr>
+              <a:t>새로운 파일을 업로드하지 않으면 기존의 파일은 유지한다</a:t>
+            </a:r>
+            <a:r>
+              <a:rPr lang="en-US" altLang="ko-KR" sz="2400" dirty="0" smtClean="0">
+                <a:latin typeface="+mn-ea"/>
+              </a:rPr>
+              <a:t>.</a:t>
+            </a:r>
+            <a:endParaRPr lang="ko-KR" altLang="en-US" sz="2400" dirty="0">
+              <a:latin typeface="+mn-ea"/>
+            </a:endParaRPr>
+          </a:p>
+        </p:txBody>
+      </p:sp>
     </p:spTree>
     <p:extLst>
       <p:ext uri="{BB962C8B-B14F-4D97-AF65-F5344CB8AC3E}">
@@ -8763,6 +9016,7 @@
               <a:rPr lang="en-US" altLang="ko-KR" sz="2000" dirty="0" smtClean="0"/>
               <a:t>)</a:t>
             </a:r>
+            <a:endParaRPr lang="en-US" altLang="ko-KR" sz="2000" dirty="0" smtClean="0"/>
           </a:p>
         </p:txBody>
       </p:sp>
@@ -9524,11 +9778,7 @@
             </a:r>
             <a:r>
               <a:rPr lang="en-US" altLang="ko-KR" sz="2000" dirty="0" smtClean="0"/>
-              <a:t>. </a:t>
-            </a:r>
-            <a:r>
-              <a:rPr lang="en-US" altLang="ko-KR" sz="2000" dirty="0" smtClean="0"/>
-              <a:t>data</a:t>
+              <a:t>. data</a:t>
             </a:r>
             <a:r>
               <a:rPr lang="ko-KR" altLang="en-US" sz="2000" dirty="0" smtClean="0"/>
@@ -9546,7 +9796,6 @@
               <a:rPr lang="en-US" altLang="ko-KR" sz="2000" dirty="0" smtClean="0"/>
               <a:t>.</a:t>
             </a:r>
-            <a:endParaRPr lang="en-US" altLang="ko-KR" sz="2000" dirty="0" smtClean="0"/>
           </a:p>
           <a:p>
             <a:pPr marL="457200" indent="-457200">
@@ -11355,13 +11604,7 @@
               <a:rPr lang="ko-KR" altLang="en-US" sz="4000" dirty="0" smtClean="0">
                 <a:latin typeface="+mn-ea"/>
               </a:rPr>
-              <a:t>일기장 </a:t>
-            </a:r>
-            <a:r>
-              <a:rPr lang="ko-KR" altLang="en-US" sz="4000" dirty="0" smtClean="0">
-                <a:latin typeface="+mn-ea"/>
-              </a:rPr>
-              <a:t>리스트 정렬 방법</a:t>
+              <a:t>일기장 리스트 정렬 방법</a:t>
             </a:r>
             <a:endParaRPr lang="en-US" altLang="ko-KR" sz="4000" dirty="0" smtClean="0">
               <a:latin typeface="+mn-ea"/>
@@ -11409,11 +11652,7 @@
             </a:pPr>
             <a:r>
               <a:rPr lang="en-US" altLang="ko-KR" sz="3600" dirty="0" smtClean="0"/>
-              <a:t>Function </a:t>
-            </a:r>
-            <a:r>
-              <a:rPr lang="en-US" altLang="ko-KR" sz="3600" dirty="0" smtClean="0"/>
-              <a:t>order(data)</a:t>
+              <a:t>Function order(data)</a:t>
             </a:r>
             <a:endParaRPr lang="en-US" altLang="ko-KR" sz="2000" dirty="0" smtClean="0"/>
           </a:p>
@@ -11519,7 +11758,6 @@
               <a:rPr lang="en-US" altLang="ko-KR" sz="2000" dirty="0" smtClean="0"/>
               <a:t>.</a:t>
             </a:r>
-            <a:endParaRPr lang="en-US" altLang="ko-KR" sz="2000" dirty="0" smtClean="0"/>
           </a:p>
         </p:txBody>
       </p:sp>

</xml_diff>